<commit_message>
Responses to Reviewer Comments
</commit_message>
<xml_diff>
--- a/Journal Paper/revision/Figures_Draft_dana.pptx
+++ b/Journal Paper/revision/Figures_Draft_dana.pptx
@@ -294,7 +294,7 @@
             <a:fld id="{3BDC0BB4-687B-47EC-9825-390C08A53E98}" type="datetimeFigureOut">
               <a:rPr lang="en-US" smtClean="0"/>
               <a:pPr/>
-              <a:t>1/5/2015</a:t>
+              <a:t>4/10/2015</a:t>
             </a:fld>
             <a:endParaRPr lang="en-US"/>
           </a:p>
@@ -466,7 +466,7 @@
             <a:fld id="{3BDC0BB4-687B-47EC-9825-390C08A53E98}" type="datetimeFigureOut">
               <a:rPr lang="en-US" smtClean="0"/>
               <a:pPr/>
-              <a:t>1/5/2015</a:t>
+              <a:t>4/10/2015</a:t>
             </a:fld>
             <a:endParaRPr lang="en-US"/>
           </a:p>
@@ -648,7 +648,7 @@
             <a:fld id="{3BDC0BB4-687B-47EC-9825-390C08A53E98}" type="datetimeFigureOut">
               <a:rPr lang="en-US" smtClean="0"/>
               <a:pPr/>
-              <a:t>1/5/2015</a:t>
+              <a:t>4/10/2015</a:t>
             </a:fld>
             <a:endParaRPr lang="en-US"/>
           </a:p>
@@ -820,7 +820,7 @@
             <a:fld id="{3BDC0BB4-687B-47EC-9825-390C08A53E98}" type="datetimeFigureOut">
               <a:rPr lang="en-US" smtClean="0"/>
               <a:pPr/>
-              <a:t>1/5/2015</a:t>
+              <a:t>4/10/2015</a:t>
             </a:fld>
             <a:endParaRPr lang="en-US"/>
           </a:p>
@@ -1068,7 +1068,7 @@
             <a:fld id="{3BDC0BB4-687B-47EC-9825-390C08A53E98}" type="datetimeFigureOut">
               <a:rPr lang="en-US" smtClean="0"/>
               <a:pPr/>
-              <a:t>1/5/2015</a:t>
+              <a:t>4/10/2015</a:t>
             </a:fld>
             <a:endParaRPr lang="en-US"/>
           </a:p>
@@ -1358,7 +1358,7 @@
             <a:fld id="{3BDC0BB4-687B-47EC-9825-390C08A53E98}" type="datetimeFigureOut">
               <a:rPr lang="en-US" smtClean="0"/>
               <a:pPr/>
-              <a:t>1/5/2015</a:t>
+              <a:t>4/10/2015</a:t>
             </a:fld>
             <a:endParaRPr lang="en-US"/>
           </a:p>
@@ -1782,7 +1782,7 @@
             <a:fld id="{3BDC0BB4-687B-47EC-9825-390C08A53E98}" type="datetimeFigureOut">
               <a:rPr lang="en-US" smtClean="0"/>
               <a:pPr/>
-              <a:t>1/5/2015</a:t>
+              <a:t>4/10/2015</a:t>
             </a:fld>
             <a:endParaRPr lang="en-US"/>
           </a:p>
@@ -1902,7 +1902,7 @@
             <a:fld id="{3BDC0BB4-687B-47EC-9825-390C08A53E98}" type="datetimeFigureOut">
               <a:rPr lang="en-US" smtClean="0"/>
               <a:pPr/>
-              <a:t>1/5/2015</a:t>
+              <a:t>4/10/2015</a:t>
             </a:fld>
             <a:endParaRPr lang="en-US"/>
           </a:p>
@@ -1999,7 +1999,7 @@
             <a:fld id="{3BDC0BB4-687B-47EC-9825-390C08A53E98}" type="datetimeFigureOut">
               <a:rPr lang="en-US" smtClean="0"/>
               <a:pPr/>
-              <a:t>1/5/2015</a:t>
+              <a:t>4/10/2015</a:t>
             </a:fld>
             <a:endParaRPr lang="en-US"/>
           </a:p>
@@ -2278,7 +2278,7 @@
             <a:fld id="{3BDC0BB4-687B-47EC-9825-390C08A53E98}" type="datetimeFigureOut">
               <a:rPr lang="en-US" smtClean="0"/>
               <a:pPr/>
-              <a:t>1/5/2015</a:t>
+              <a:t>4/10/2015</a:t>
             </a:fld>
             <a:endParaRPr lang="en-US"/>
           </a:p>
@@ -2533,7 +2533,7 @@
             <a:fld id="{3BDC0BB4-687B-47EC-9825-390C08A53E98}" type="datetimeFigureOut">
               <a:rPr lang="en-US" smtClean="0"/>
               <a:pPr/>
-              <a:t>1/5/2015</a:t>
+              <a:t>4/10/2015</a:t>
             </a:fld>
             <a:endParaRPr lang="en-US"/>
           </a:p>
@@ -2748,7 +2748,7 @@
             <a:fld id="{3BDC0BB4-687B-47EC-9825-390C08A53E98}" type="datetimeFigureOut">
               <a:rPr lang="en-US" smtClean="0"/>
               <a:pPr/>
-              <a:t>1/5/2015</a:t>
+              <a:t>4/10/2015</a:t>
             </a:fld>
             <a:endParaRPr lang="en-US"/>
           </a:p>
@@ -5368,15 +5368,7 @@
                     <a:schemeClr val="tx1"/>
                   </a:solidFill>
                 </a:rPr>
-                <a:t>cotton </a:t>
-              </a:r>
-              <a:r>
-                <a:rPr lang="en-US" sz="1400" b="1" dirty="0">
-                  <a:solidFill>
-                    <a:schemeClr val="tx1"/>
-                  </a:solidFill>
-                </a:rPr>
-                <a:t>[</a:t>
+                <a:t>cotton [</a:t>
               </a:r>
               <a:r>
                 <a:rPr lang="en-US" sz="1400" b="1" i="1" dirty="0" err="1">
@@ -8334,7 +8326,7 @@
         </p:nvSpPr>
         <p:spPr>
           <a:xfrm>
-            <a:off x="4775576" y="5658136"/>
+            <a:off x="4953000" y="5658136"/>
             <a:ext cx="1524000" cy="762000"/>
           </a:xfrm>
           <a:prstGeom prst="rect">
@@ -8468,9 +8460,9 @@
             <a:avLst/>
           </a:prstGeom>
           <a:solidFill>
-            <a:schemeClr val="accent3">
-              <a:lumMod val="40000"/>
-              <a:lumOff val="60000"/>
+            <a:schemeClr val="accent1">
+              <a:lumMod val="60000"/>
+              <a:lumOff val="40000"/>
             </a:schemeClr>
           </a:solidFill>
           <a:ln>
@@ -8503,14 +8495,14 @@
             <a:r>
               <a:rPr lang="en-US" sz="1400" b="1" dirty="0" smtClean="0">
                 <a:solidFill>
-                  <a:schemeClr val="tx1"/>
+                  <a:schemeClr val="bg1"/>
                 </a:solidFill>
               </a:rPr>
               <a:t>Crop Water Demand</a:t>
             </a:r>
             <a:endParaRPr lang="en-US" sz="1400" b="1" dirty="0">
               <a:solidFill>
-                <a:schemeClr val="tx1"/>
+                <a:schemeClr val="bg1"/>
               </a:solidFill>
             </a:endParaRPr>
           </a:p>
@@ -8526,7 +8518,7 @@
         </p:nvSpPr>
         <p:spPr>
           <a:xfrm>
-            <a:off x="3521120" y="5554640"/>
+            <a:off x="3657600" y="5554640"/>
             <a:ext cx="1447800" cy="939799"/>
           </a:xfrm>
           <a:prstGeom prst="rightArrow">
@@ -9555,7 +9547,7 @@
         <p:spPr>
           <a:xfrm flipV="1">
             <a:off x="3229288" y="6024540"/>
-            <a:ext cx="291832" cy="282834"/>
+            <a:ext cx="428312" cy="282834"/>
           </a:xfrm>
           <a:prstGeom prst="curvedConnector3">
             <a:avLst>
@@ -9808,7 +9800,7 @@
         </p:nvSpPr>
         <p:spPr>
           <a:xfrm>
-            <a:off x="3137848" y="1217214"/>
+            <a:off x="3200400" y="1219200"/>
             <a:ext cx="2606040" cy="1371600"/>
           </a:xfrm>
           <a:prstGeom prst="diamond">
@@ -9868,13 +9860,14 @@
           <p:cNvCxnSpPr>
             <a:cxnSpLocks noChangeAspect="1"/>
             <a:stCxn id="32" idx="2"/>
+            <a:endCxn id="28" idx="7"/>
           </p:cNvCxnSpPr>
           <p:nvPr/>
         </p:nvCxnSpPr>
         <p:spPr>
           <a:xfrm rot="5400000">
-            <a:off x="3987148" y="2281088"/>
-            <a:ext cx="145994" cy="761446"/>
+            <a:off x="4019417" y="2250805"/>
+            <a:ext cx="144008" cy="823998"/>
           </a:xfrm>
           <a:prstGeom prst="curvedConnector3">
             <a:avLst>
@@ -10163,50 +10156,6 @@
       </p:sp>
       <p:cxnSp>
         <p:nvCxnSpPr>
-          <p:cNvPr id="39" name="Shape 159"/>
-          <p:cNvCxnSpPr>
-            <a:cxnSpLocks noChangeAspect="1"/>
-            <a:stCxn id="38" idx="6"/>
-            <a:endCxn id="10" idx="1"/>
-          </p:cNvCxnSpPr>
-          <p:nvPr/>
-        </p:nvCxnSpPr>
-        <p:spPr>
-          <a:xfrm>
-            <a:off x="7074544" y="3032884"/>
-            <a:ext cx="457880" cy="1128352"/>
-          </a:xfrm>
-          <a:prstGeom prst="curvedConnector3">
-            <a:avLst>
-              <a:gd name="adj1" fmla="val 50000"/>
-            </a:avLst>
-          </a:prstGeom>
-          <a:ln w="38100">
-            <a:solidFill>
-              <a:schemeClr val="bg1">
-                <a:lumMod val="65000"/>
-              </a:schemeClr>
-            </a:solidFill>
-            <a:tailEnd type="triangle"/>
-          </a:ln>
-        </p:spPr>
-        <p:style>
-          <a:lnRef idx="1">
-            <a:schemeClr val="accent1"/>
-          </a:lnRef>
-          <a:fillRef idx="0">
-            <a:schemeClr val="accent1"/>
-          </a:fillRef>
-          <a:effectRef idx="0">
-            <a:schemeClr val="accent1"/>
-          </a:effectRef>
-          <a:fontRef idx="minor">
-            <a:schemeClr val="tx1"/>
-          </a:fontRef>
-        </p:style>
-      </p:cxnSp>
-      <p:cxnSp>
-        <p:nvCxnSpPr>
           <p:cNvPr id="40" name="Curved Connector 39"/>
           <p:cNvCxnSpPr>
             <a:cxnSpLocks noChangeAspect="1"/>
@@ -10291,318 +10240,6 @@
           </a:fontRef>
         </p:style>
       </p:cxnSp>
-      <p:grpSp>
-        <p:nvGrpSpPr>
-          <p:cNvPr id="42" name="Group 112"/>
-          <p:cNvGrpSpPr/>
-          <p:nvPr/>
-        </p:nvGrpSpPr>
-        <p:grpSpPr>
-          <a:xfrm>
-            <a:off x="304800" y="122832"/>
-            <a:ext cx="2994678" cy="895064"/>
-            <a:chOff x="304800" y="150128"/>
-            <a:chExt cx="2994678" cy="895064"/>
-          </a:xfrm>
-        </p:grpSpPr>
-        <p:grpSp>
-          <p:nvGrpSpPr>
-            <p:cNvPr id="43" name="Group 110"/>
-            <p:cNvGrpSpPr/>
-            <p:nvPr/>
-          </p:nvGrpSpPr>
-          <p:grpSpPr>
-            <a:xfrm>
-              <a:off x="404880" y="228600"/>
-              <a:ext cx="2894598" cy="757813"/>
-              <a:chOff x="595952" y="283192"/>
-              <a:chExt cx="2894598" cy="757813"/>
-            </a:xfrm>
-          </p:grpSpPr>
-          <p:sp>
-            <p:nvSpPr>
-              <p:cNvPr id="45" name="Flowchart: Decision 44"/>
-              <p:cNvSpPr/>
-              <p:nvPr/>
-            </p:nvSpPr>
-            <p:spPr>
-              <a:xfrm>
-                <a:off x="595952" y="304800"/>
-                <a:ext cx="381000" cy="182880"/>
-              </a:xfrm>
-              <a:prstGeom prst="flowChartDecision">
-                <a:avLst/>
-              </a:prstGeom>
-              <a:solidFill>
-                <a:schemeClr val="bg1">
-                  <a:lumMod val="85000"/>
-                </a:schemeClr>
-              </a:solidFill>
-              <a:ln>
-                <a:solidFill>
-                  <a:schemeClr val="tx1"/>
-                </a:solidFill>
-              </a:ln>
-            </p:spPr>
-            <p:style>
-              <a:lnRef idx="2">
-                <a:schemeClr val="accent1">
-                  <a:shade val="50000"/>
-                </a:schemeClr>
-              </a:lnRef>
-              <a:fillRef idx="1">
-                <a:schemeClr val="accent1"/>
-              </a:fillRef>
-              <a:effectRef idx="0">
-                <a:schemeClr val="accent1"/>
-              </a:effectRef>
-              <a:fontRef idx="minor">
-                <a:schemeClr val="lt1"/>
-              </a:fontRef>
-            </p:style>
-            <p:txBody>
-              <a:bodyPr rtlCol="0" anchor="ctr"/>
-              <a:lstStyle/>
-              <a:p>
-                <a:pPr algn="ctr"/>
-                <a:endParaRPr lang="en-US"/>
-              </a:p>
-            </p:txBody>
-          </p:sp>
-          <p:sp>
-            <p:nvSpPr>
-              <p:cNvPr id="46" name="TextBox 45"/>
-              <p:cNvSpPr txBox="1"/>
-              <p:nvPr/>
-            </p:nvSpPr>
-            <p:spPr>
-              <a:xfrm>
-                <a:off x="1074760" y="283192"/>
-                <a:ext cx="1943032" cy="284693"/>
-              </a:xfrm>
-              <a:prstGeom prst="rect">
-                <a:avLst/>
-              </a:prstGeom>
-              <a:noFill/>
-            </p:spPr>
-            <p:txBody>
-              <a:bodyPr wrap="none" rtlCol="0">
-                <a:spAutoFit/>
-              </a:bodyPr>
-              <a:lstStyle/>
-              <a:p>
-                <a:r>
-                  <a:rPr lang="en-US" sz="1250" dirty="0" smtClean="0"/>
-                  <a:t>Model controls or switches</a:t>
-                </a:r>
-              </a:p>
-            </p:txBody>
-          </p:sp>
-          <p:sp>
-            <p:nvSpPr>
-              <p:cNvPr id="47" name="TextBox 46"/>
-              <p:cNvSpPr txBox="1"/>
-              <p:nvPr/>
-            </p:nvSpPr>
-            <p:spPr>
-              <a:xfrm>
-                <a:off x="1074760" y="517480"/>
-                <a:ext cx="1368452" cy="284693"/>
-              </a:xfrm>
-              <a:prstGeom prst="rect">
-                <a:avLst/>
-              </a:prstGeom>
-              <a:noFill/>
-            </p:spPr>
-            <p:txBody>
-              <a:bodyPr wrap="none" rtlCol="0">
-                <a:spAutoFit/>
-              </a:bodyPr>
-              <a:lstStyle/>
-              <a:p>
-                <a:r>
-                  <a:rPr lang="en-US" sz="1250" dirty="0" smtClean="0"/>
-                  <a:t>Exogenous Inputs </a:t>
-                </a:r>
-              </a:p>
-            </p:txBody>
-          </p:sp>
-          <p:sp>
-            <p:nvSpPr>
-              <p:cNvPr id="48" name="Oval 47"/>
-              <p:cNvSpPr/>
-              <p:nvPr/>
-            </p:nvSpPr>
-            <p:spPr>
-              <a:xfrm>
-                <a:off x="623248" y="555008"/>
-                <a:ext cx="320040" cy="182880"/>
-              </a:xfrm>
-              <a:prstGeom prst="ellipse">
-                <a:avLst/>
-              </a:prstGeom>
-              <a:solidFill>
-                <a:schemeClr val="accent6">
-                  <a:lumMod val="60000"/>
-                  <a:lumOff val="40000"/>
-                </a:schemeClr>
-              </a:solidFill>
-              <a:ln>
-                <a:solidFill>
-                  <a:schemeClr val="tx1"/>
-                </a:solidFill>
-              </a:ln>
-            </p:spPr>
-            <p:style>
-              <a:lnRef idx="2">
-                <a:schemeClr val="accent1">
-                  <a:shade val="50000"/>
-                </a:schemeClr>
-              </a:lnRef>
-              <a:fillRef idx="1">
-                <a:schemeClr val="accent1"/>
-              </a:fillRef>
-              <a:effectRef idx="0">
-                <a:schemeClr val="accent1"/>
-              </a:effectRef>
-              <a:fontRef idx="minor">
-                <a:schemeClr val="lt1"/>
-              </a:fontRef>
-            </p:style>
-            <p:txBody>
-              <a:bodyPr rtlCol="0" anchor="ctr"/>
-              <a:lstStyle/>
-              <a:p>
-                <a:pPr algn="ctr"/>
-                <a:endParaRPr lang="en-US"/>
-              </a:p>
-            </p:txBody>
-          </p:sp>
-          <p:sp>
-            <p:nvSpPr>
-              <p:cNvPr id="49" name="Oval 48"/>
-              <p:cNvSpPr/>
-              <p:nvPr/>
-            </p:nvSpPr>
-            <p:spPr>
-              <a:xfrm>
-                <a:off x="625520" y="816592"/>
-                <a:ext cx="320040" cy="182880"/>
-              </a:xfrm>
-              <a:prstGeom prst="ellipse">
-                <a:avLst/>
-              </a:prstGeom>
-              <a:solidFill>
-                <a:schemeClr val="bg1"/>
-              </a:solidFill>
-              <a:ln>
-                <a:solidFill>
-                  <a:schemeClr val="tx1"/>
-                </a:solidFill>
-              </a:ln>
-            </p:spPr>
-            <p:style>
-              <a:lnRef idx="2">
-                <a:schemeClr val="accent1">
-                  <a:shade val="50000"/>
-                </a:schemeClr>
-              </a:lnRef>
-              <a:fillRef idx="1">
-                <a:schemeClr val="accent1"/>
-              </a:fillRef>
-              <a:effectRef idx="0">
-                <a:schemeClr val="accent1"/>
-              </a:effectRef>
-              <a:fontRef idx="minor">
-                <a:schemeClr val="lt1"/>
-              </a:fontRef>
-            </p:style>
-            <p:txBody>
-              <a:bodyPr rtlCol="0" anchor="ctr"/>
-              <a:lstStyle/>
-              <a:p>
-                <a:pPr algn="ctr"/>
-                <a:endParaRPr lang="en-US"/>
-              </a:p>
-            </p:txBody>
-          </p:sp>
-          <p:sp>
-            <p:nvSpPr>
-              <p:cNvPr id="50" name="TextBox 49"/>
-              <p:cNvSpPr txBox="1"/>
-              <p:nvPr/>
-            </p:nvSpPr>
-            <p:spPr>
-              <a:xfrm>
-                <a:off x="1074760" y="756312"/>
-                <a:ext cx="2415790" cy="284693"/>
-              </a:xfrm>
-              <a:prstGeom prst="rect">
-                <a:avLst/>
-              </a:prstGeom>
-              <a:noFill/>
-            </p:spPr>
-            <p:txBody>
-              <a:bodyPr wrap="none" rtlCol="0">
-                <a:spAutoFit/>
-              </a:bodyPr>
-              <a:lstStyle/>
-              <a:p>
-                <a:r>
-                  <a:rPr lang="en-US" sz="1250" dirty="0" smtClean="0"/>
-                  <a:t>Endogenously calculated variables</a:t>
-                </a:r>
-              </a:p>
-            </p:txBody>
-          </p:sp>
-        </p:grpSp>
-        <p:sp>
-          <p:nvSpPr>
-            <p:cNvPr id="44" name="Rectangle 43"/>
-            <p:cNvSpPr/>
-            <p:nvPr/>
-          </p:nvSpPr>
-          <p:spPr>
-            <a:xfrm>
-              <a:off x="304800" y="150128"/>
-              <a:ext cx="2971800" cy="895064"/>
-            </a:xfrm>
-            <a:prstGeom prst="rect">
-              <a:avLst/>
-            </a:prstGeom>
-            <a:noFill/>
-            <a:ln>
-              <a:solidFill>
-                <a:schemeClr val="bg1">
-                  <a:lumMod val="75000"/>
-                </a:schemeClr>
-              </a:solidFill>
-            </a:ln>
-          </p:spPr>
-          <p:style>
-            <a:lnRef idx="2">
-              <a:schemeClr val="accent6"/>
-            </a:lnRef>
-            <a:fillRef idx="1">
-              <a:schemeClr val="lt1"/>
-            </a:fillRef>
-            <a:effectRef idx="0">
-              <a:schemeClr val="accent6"/>
-            </a:effectRef>
-            <a:fontRef idx="minor">
-              <a:schemeClr val="dk1"/>
-            </a:fontRef>
-          </p:style>
-          <p:txBody>
-            <a:bodyPr rtlCol="0" anchor="ctr"/>
-            <a:lstStyle/>
-            <a:p>
-              <a:pPr algn="ctr"/>
-              <a:endParaRPr lang="en-US"/>
-            </a:p>
-          </p:txBody>
-        </p:sp>
-      </p:grpSp>
       <p:cxnSp>
         <p:nvCxnSpPr>
           <p:cNvPr id="75" name="Curved Connector 74"/>
@@ -10812,6 +10449,545 @@
           </a:p>
         </p:txBody>
       </p:sp>
+      <p:cxnSp>
+        <p:nvCxnSpPr>
+          <p:cNvPr id="51" name="Curved Connector 50"/>
+          <p:cNvCxnSpPr>
+            <a:cxnSpLocks noChangeAspect="1"/>
+            <a:stCxn id="38" idx="6"/>
+            <a:endCxn id="10" idx="1"/>
+          </p:cNvCxnSpPr>
+          <p:nvPr/>
+        </p:nvCxnSpPr>
+        <p:spPr>
+          <a:xfrm>
+            <a:off x="7074544" y="3032884"/>
+            <a:ext cx="457880" cy="1128352"/>
+          </a:xfrm>
+          <a:prstGeom prst="curvedConnector3">
+            <a:avLst>
+              <a:gd name="adj1" fmla="val 50000"/>
+            </a:avLst>
+          </a:prstGeom>
+          <a:ln w="38100">
+            <a:solidFill>
+              <a:schemeClr val="tx1">
+                <a:alpha val="41000"/>
+              </a:schemeClr>
+            </a:solidFill>
+            <a:tailEnd type="triangle" w="lg" len="med"/>
+          </a:ln>
+        </p:spPr>
+        <p:style>
+          <a:lnRef idx="1">
+            <a:schemeClr val="accent1"/>
+          </a:lnRef>
+          <a:fillRef idx="0">
+            <a:schemeClr val="accent1"/>
+          </a:fillRef>
+          <a:effectRef idx="0">
+            <a:schemeClr val="accent1"/>
+          </a:effectRef>
+          <a:fontRef idx="minor">
+            <a:schemeClr val="tx1"/>
+          </a:fontRef>
+        </p:style>
+      </p:cxnSp>
+      <p:grpSp>
+        <p:nvGrpSpPr>
+          <p:cNvPr id="56" name="Group 55"/>
+          <p:cNvGrpSpPr/>
+          <p:nvPr/>
+        </p:nvGrpSpPr>
+        <p:grpSpPr>
+          <a:xfrm>
+            <a:off x="89848" y="95536"/>
+            <a:ext cx="4024952" cy="895064"/>
+            <a:chOff x="242248" y="76200"/>
+            <a:chExt cx="4024952" cy="895064"/>
+          </a:xfrm>
+        </p:grpSpPr>
+        <p:grpSp>
+          <p:nvGrpSpPr>
+            <p:cNvPr id="42" name="Group 112"/>
+            <p:cNvGrpSpPr/>
+            <p:nvPr/>
+          </p:nvGrpSpPr>
+          <p:grpSpPr>
+            <a:xfrm>
+              <a:off x="242248" y="76200"/>
+              <a:ext cx="4024952" cy="895064"/>
+              <a:chOff x="-725474" y="150128"/>
+              <a:chExt cx="4024952" cy="895064"/>
+            </a:xfrm>
+          </p:grpSpPr>
+          <p:grpSp>
+            <p:nvGrpSpPr>
+              <p:cNvPr id="43" name="Group 110"/>
+              <p:cNvGrpSpPr/>
+              <p:nvPr/>
+            </p:nvGrpSpPr>
+            <p:grpSpPr>
+              <a:xfrm>
+                <a:off x="404880" y="228600"/>
+                <a:ext cx="2894598" cy="757813"/>
+                <a:chOff x="595952" y="283192"/>
+                <a:chExt cx="2894598" cy="757813"/>
+              </a:xfrm>
+            </p:grpSpPr>
+            <p:sp>
+              <p:nvSpPr>
+                <p:cNvPr id="45" name="Flowchart: Decision 44"/>
+                <p:cNvSpPr/>
+                <p:nvPr/>
+              </p:nvSpPr>
+              <p:spPr>
+                <a:xfrm>
+                  <a:off x="595952" y="304800"/>
+                  <a:ext cx="381000" cy="182880"/>
+                </a:xfrm>
+                <a:prstGeom prst="flowChartDecision">
+                  <a:avLst/>
+                </a:prstGeom>
+                <a:solidFill>
+                  <a:schemeClr val="bg1">
+                    <a:lumMod val="85000"/>
+                  </a:schemeClr>
+                </a:solidFill>
+                <a:ln>
+                  <a:solidFill>
+                    <a:schemeClr val="tx1"/>
+                  </a:solidFill>
+                </a:ln>
+              </p:spPr>
+              <p:style>
+                <a:lnRef idx="2">
+                  <a:schemeClr val="accent1">
+                    <a:shade val="50000"/>
+                  </a:schemeClr>
+                </a:lnRef>
+                <a:fillRef idx="1">
+                  <a:schemeClr val="accent1"/>
+                </a:fillRef>
+                <a:effectRef idx="0">
+                  <a:schemeClr val="accent1"/>
+                </a:effectRef>
+                <a:fontRef idx="minor">
+                  <a:schemeClr val="lt1"/>
+                </a:fontRef>
+              </p:style>
+              <p:txBody>
+                <a:bodyPr rtlCol="0" anchor="ctr"/>
+                <a:lstStyle/>
+                <a:p>
+                  <a:pPr algn="ctr"/>
+                  <a:endParaRPr lang="en-US"/>
+                </a:p>
+              </p:txBody>
+            </p:sp>
+            <p:sp>
+              <p:nvSpPr>
+                <p:cNvPr id="46" name="TextBox 45"/>
+                <p:cNvSpPr txBox="1"/>
+                <p:nvPr/>
+              </p:nvSpPr>
+              <p:spPr>
+                <a:xfrm>
+                  <a:off x="1074760" y="283192"/>
+                  <a:ext cx="1943032" cy="284693"/>
+                </a:xfrm>
+                <a:prstGeom prst="rect">
+                  <a:avLst/>
+                </a:prstGeom>
+                <a:noFill/>
+              </p:spPr>
+              <p:txBody>
+                <a:bodyPr wrap="none" rtlCol="0">
+                  <a:spAutoFit/>
+                </a:bodyPr>
+                <a:lstStyle/>
+                <a:p>
+                  <a:r>
+                    <a:rPr lang="en-US" sz="1250" dirty="0" smtClean="0"/>
+                    <a:t>Model controls or switches</a:t>
+                  </a:r>
+                </a:p>
+              </p:txBody>
+            </p:sp>
+            <p:sp>
+              <p:nvSpPr>
+                <p:cNvPr id="47" name="TextBox 46"/>
+                <p:cNvSpPr txBox="1"/>
+                <p:nvPr/>
+              </p:nvSpPr>
+              <p:spPr>
+                <a:xfrm>
+                  <a:off x="1074760" y="517480"/>
+                  <a:ext cx="1368452" cy="284693"/>
+                </a:xfrm>
+                <a:prstGeom prst="rect">
+                  <a:avLst/>
+                </a:prstGeom>
+                <a:noFill/>
+              </p:spPr>
+              <p:txBody>
+                <a:bodyPr wrap="none" rtlCol="0">
+                  <a:spAutoFit/>
+                </a:bodyPr>
+                <a:lstStyle/>
+                <a:p>
+                  <a:r>
+                    <a:rPr lang="en-US" sz="1250" dirty="0" smtClean="0"/>
+                    <a:t>Exogenous Inputs </a:t>
+                  </a:r>
+                </a:p>
+              </p:txBody>
+            </p:sp>
+            <p:sp>
+              <p:nvSpPr>
+                <p:cNvPr id="48" name="Oval 47"/>
+                <p:cNvSpPr/>
+                <p:nvPr/>
+              </p:nvSpPr>
+              <p:spPr>
+                <a:xfrm>
+                  <a:off x="623248" y="555008"/>
+                  <a:ext cx="320040" cy="182880"/>
+                </a:xfrm>
+                <a:prstGeom prst="ellipse">
+                  <a:avLst/>
+                </a:prstGeom>
+                <a:solidFill>
+                  <a:schemeClr val="accent6">
+                    <a:lumMod val="60000"/>
+                    <a:lumOff val="40000"/>
+                  </a:schemeClr>
+                </a:solidFill>
+                <a:ln>
+                  <a:solidFill>
+                    <a:schemeClr val="tx1"/>
+                  </a:solidFill>
+                </a:ln>
+              </p:spPr>
+              <p:style>
+                <a:lnRef idx="2">
+                  <a:schemeClr val="accent1">
+                    <a:shade val="50000"/>
+                  </a:schemeClr>
+                </a:lnRef>
+                <a:fillRef idx="1">
+                  <a:schemeClr val="accent1"/>
+                </a:fillRef>
+                <a:effectRef idx="0">
+                  <a:schemeClr val="accent1"/>
+                </a:effectRef>
+                <a:fontRef idx="minor">
+                  <a:schemeClr val="lt1"/>
+                </a:fontRef>
+              </p:style>
+              <p:txBody>
+                <a:bodyPr rtlCol="0" anchor="ctr"/>
+                <a:lstStyle/>
+                <a:p>
+                  <a:pPr algn="ctr"/>
+                  <a:endParaRPr lang="en-US"/>
+                </a:p>
+              </p:txBody>
+            </p:sp>
+            <p:sp>
+              <p:nvSpPr>
+                <p:cNvPr id="49" name="Oval 48"/>
+                <p:cNvSpPr/>
+                <p:nvPr/>
+              </p:nvSpPr>
+              <p:spPr>
+                <a:xfrm>
+                  <a:off x="625520" y="816592"/>
+                  <a:ext cx="320040" cy="182880"/>
+                </a:xfrm>
+                <a:prstGeom prst="ellipse">
+                  <a:avLst/>
+                </a:prstGeom>
+                <a:solidFill>
+                  <a:schemeClr val="bg1"/>
+                </a:solidFill>
+                <a:ln>
+                  <a:solidFill>
+                    <a:schemeClr val="tx1"/>
+                  </a:solidFill>
+                </a:ln>
+              </p:spPr>
+              <p:style>
+                <a:lnRef idx="2">
+                  <a:schemeClr val="accent1">
+                    <a:shade val="50000"/>
+                  </a:schemeClr>
+                </a:lnRef>
+                <a:fillRef idx="1">
+                  <a:schemeClr val="accent1"/>
+                </a:fillRef>
+                <a:effectRef idx="0">
+                  <a:schemeClr val="accent1"/>
+                </a:effectRef>
+                <a:fontRef idx="minor">
+                  <a:schemeClr val="lt1"/>
+                </a:fontRef>
+              </p:style>
+              <p:txBody>
+                <a:bodyPr rtlCol="0" anchor="ctr"/>
+                <a:lstStyle/>
+                <a:p>
+                  <a:pPr algn="ctr"/>
+                  <a:endParaRPr lang="en-US"/>
+                </a:p>
+              </p:txBody>
+            </p:sp>
+            <p:sp>
+              <p:nvSpPr>
+                <p:cNvPr id="50" name="TextBox 49"/>
+                <p:cNvSpPr txBox="1"/>
+                <p:nvPr/>
+              </p:nvSpPr>
+              <p:spPr>
+                <a:xfrm>
+                  <a:off x="1074760" y="756312"/>
+                  <a:ext cx="2415790" cy="284693"/>
+                </a:xfrm>
+                <a:prstGeom prst="rect">
+                  <a:avLst/>
+                </a:prstGeom>
+                <a:noFill/>
+              </p:spPr>
+              <p:txBody>
+                <a:bodyPr wrap="none" rtlCol="0">
+                  <a:spAutoFit/>
+                </a:bodyPr>
+                <a:lstStyle/>
+                <a:p>
+                  <a:r>
+                    <a:rPr lang="en-US" sz="1250" dirty="0" smtClean="0"/>
+                    <a:t>Endogenously calculated variables</a:t>
+                  </a:r>
+                </a:p>
+              </p:txBody>
+            </p:sp>
+          </p:grpSp>
+          <p:sp>
+            <p:nvSpPr>
+              <p:cNvPr id="44" name="Rectangle 43"/>
+              <p:cNvSpPr/>
+              <p:nvPr/>
+            </p:nvSpPr>
+            <p:spPr>
+              <a:xfrm>
+                <a:off x="-725474" y="150128"/>
+                <a:ext cx="4002074" cy="895064"/>
+              </a:xfrm>
+              <a:prstGeom prst="rect">
+                <a:avLst/>
+              </a:prstGeom>
+              <a:noFill/>
+              <a:ln>
+                <a:solidFill>
+                  <a:schemeClr val="bg1">
+                    <a:lumMod val="75000"/>
+                  </a:schemeClr>
+                </a:solidFill>
+              </a:ln>
+            </p:spPr>
+            <p:style>
+              <a:lnRef idx="2">
+                <a:schemeClr val="accent6"/>
+              </a:lnRef>
+              <a:fillRef idx="1">
+                <a:schemeClr val="lt1"/>
+              </a:fillRef>
+              <a:effectRef idx="0">
+                <a:schemeClr val="accent6"/>
+              </a:effectRef>
+              <a:fontRef idx="minor">
+                <a:schemeClr val="dk1"/>
+              </a:fontRef>
+            </p:style>
+            <p:txBody>
+              <a:bodyPr rtlCol="0" anchor="ctr"/>
+              <a:lstStyle/>
+              <a:p>
+                <a:pPr algn="ctr"/>
+                <a:endParaRPr lang="en-US"/>
+              </a:p>
+            </p:txBody>
+          </p:sp>
+        </p:grpSp>
+        <p:sp>
+          <p:nvSpPr>
+            <p:cNvPr id="54" name="Right Arrow 53"/>
+            <p:cNvSpPr>
+              <a:spLocks noChangeAspect="1"/>
+            </p:cNvSpPr>
+            <p:nvPr/>
+          </p:nvSpPr>
+          <p:spPr>
+            <a:xfrm>
+              <a:off x="390397" y="474711"/>
+              <a:ext cx="295403" cy="191753"/>
+            </a:xfrm>
+            <a:prstGeom prst="rightArrow">
+              <a:avLst/>
+            </a:prstGeom>
+            <a:solidFill>
+              <a:schemeClr val="bg1"/>
+            </a:solidFill>
+            <a:ln>
+              <a:solidFill>
+                <a:schemeClr val="tx1"/>
+              </a:solidFill>
+            </a:ln>
+          </p:spPr>
+          <p:style>
+            <a:lnRef idx="2">
+              <a:schemeClr val="accent1">
+                <a:shade val="50000"/>
+              </a:schemeClr>
+            </a:lnRef>
+            <a:fillRef idx="1">
+              <a:schemeClr val="accent1"/>
+            </a:fillRef>
+            <a:effectRef idx="0">
+              <a:schemeClr val="accent1"/>
+            </a:effectRef>
+            <a:fontRef idx="minor">
+              <a:schemeClr val="lt1"/>
+            </a:fontRef>
+          </p:style>
+          <p:txBody>
+            <a:bodyPr rtlCol="0" anchor="ctr"/>
+            <a:lstStyle/>
+            <a:p>
+              <a:pPr algn="ctr"/>
+              <a:endParaRPr lang="en-US" sz="1400" b="1" dirty="0">
+                <a:solidFill>
+                  <a:schemeClr val="bg1"/>
+                </a:solidFill>
+              </a:endParaRPr>
+            </a:p>
+          </p:txBody>
+        </p:sp>
+        <p:sp>
+          <p:nvSpPr>
+            <p:cNvPr id="55" name="Rectangle 54"/>
+            <p:cNvSpPr>
+              <a:spLocks noChangeAspect="1"/>
+            </p:cNvSpPr>
+            <p:nvPr/>
+          </p:nvSpPr>
+          <p:spPr>
+            <a:xfrm>
+              <a:off x="381000" y="178279"/>
+              <a:ext cx="300831" cy="150416"/>
+            </a:xfrm>
+            <a:prstGeom prst="rect">
+              <a:avLst/>
+            </a:prstGeom>
+            <a:solidFill>
+              <a:schemeClr val="bg1"/>
+            </a:solidFill>
+            <a:ln>
+              <a:solidFill>
+                <a:schemeClr val="tx1"/>
+              </a:solidFill>
+            </a:ln>
+          </p:spPr>
+          <p:style>
+            <a:lnRef idx="2">
+              <a:schemeClr val="accent1">
+                <a:shade val="50000"/>
+              </a:schemeClr>
+            </a:lnRef>
+            <a:fillRef idx="1">
+              <a:schemeClr val="accent1"/>
+            </a:fillRef>
+            <a:effectRef idx="0">
+              <a:schemeClr val="accent1"/>
+            </a:effectRef>
+            <a:fontRef idx="minor">
+              <a:schemeClr val="lt1"/>
+            </a:fontRef>
+          </p:style>
+          <p:txBody>
+            <a:bodyPr rtlCol="0" anchor="ctr"/>
+            <a:lstStyle/>
+            <a:p>
+              <a:pPr algn="ctr"/>
+              <a:endParaRPr lang="en-US" b="1" dirty="0">
+                <a:solidFill>
+                  <a:schemeClr val="bg1"/>
+                </a:solidFill>
+              </a:endParaRPr>
+            </a:p>
+          </p:txBody>
+        </p:sp>
+        <p:sp>
+          <p:nvSpPr>
+            <p:cNvPr id="57" name="TextBox 56"/>
+            <p:cNvSpPr txBox="1"/>
+            <p:nvPr/>
+          </p:nvSpPr>
+          <p:spPr>
+            <a:xfrm>
+              <a:off x="762000" y="111140"/>
+              <a:ext cx="534185" cy="284693"/>
+            </a:xfrm>
+            <a:prstGeom prst="rect">
+              <a:avLst/>
+            </a:prstGeom>
+            <a:noFill/>
+          </p:spPr>
+          <p:txBody>
+            <a:bodyPr wrap="none" rtlCol="0">
+              <a:spAutoFit/>
+            </a:bodyPr>
+            <a:lstStyle/>
+            <a:p>
+              <a:r>
+                <a:rPr lang="en-US" sz="1250" dirty="0" smtClean="0"/>
+                <a:t>Stock</a:t>
+              </a:r>
+              <a:endParaRPr lang="en-US" sz="1250" dirty="0" smtClean="0"/>
+            </a:p>
+          </p:txBody>
+        </p:sp>
+        <p:sp>
+          <p:nvSpPr>
+            <p:cNvPr id="58" name="TextBox 57"/>
+            <p:cNvSpPr txBox="1"/>
+            <p:nvPr/>
+          </p:nvSpPr>
+          <p:spPr>
+            <a:xfrm>
+              <a:off x="762000" y="401107"/>
+              <a:ext cx="493405" cy="284693"/>
+            </a:xfrm>
+            <a:prstGeom prst="rect">
+              <a:avLst/>
+            </a:prstGeom>
+            <a:noFill/>
+          </p:spPr>
+          <p:txBody>
+            <a:bodyPr wrap="none" rtlCol="0">
+              <a:spAutoFit/>
+            </a:bodyPr>
+            <a:lstStyle/>
+            <a:p>
+              <a:r>
+                <a:rPr lang="en-US" sz="1250" dirty="0" smtClean="0"/>
+                <a:t>Flow</a:t>
+              </a:r>
+              <a:endParaRPr lang="en-US" sz="1250" dirty="0" smtClean="0"/>
+            </a:p>
+          </p:txBody>
+        </p:sp>
+      </p:grpSp>
     </p:spTree>
   </p:cSld>
   <p:clrMapOvr>
@@ -11399,7 +11575,7 @@
         </p:nvSpPr>
         <p:spPr>
           <a:xfrm>
-            <a:off x="838206" y="4800601"/>
+            <a:off x="783882" y="4800601"/>
             <a:ext cx="6658298" cy="738559"/>
           </a:xfrm>
           <a:prstGeom prst="flowChartInputOutput">
@@ -11530,20 +11706,12 @@
           <a:p>
             <a:pPr algn="ctr"/>
             <a:r>
-              <a:rPr lang="en-US" dirty="0" err="1" smtClean="0">
-                <a:solidFill>
-                  <a:schemeClr val="bg1"/>
-                </a:solidFill>
-              </a:rPr>
-              <a:t>Musym</a:t>
-            </a:r>
-            <a:r>
               <a:rPr lang="en-US" dirty="0" smtClean="0">
                 <a:solidFill>
                   <a:schemeClr val="bg1"/>
                 </a:solidFill>
               </a:rPr>
-              <a:t>  STATSGO </a:t>
+              <a:t>MUSYM  STATSGO2.1 </a:t>
             </a:r>
           </a:p>
           <a:p>
@@ -11656,11 +11824,7 @@
             <a:pPr algn="ctr"/>
             <a:r>
               <a:rPr lang="en-US" dirty="0" smtClean="0"/>
-              <a:t>SSURGO Available Water Capacity by </a:t>
-            </a:r>
-            <a:r>
-              <a:rPr lang="en-US" dirty="0" err="1" smtClean="0"/>
-              <a:t>Musym</a:t>
+              <a:t>SSURGO Available Water Capacity by MUSYM</a:t>
             </a:r>
             <a:endParaRPr lang="en-US" dirty="0"/>
           </a:p>
@@ -11795,11 +11959,7 @@
             <a:pPr algn="ctr"/>
             <a:r>
               <a:rPr lang="en-US" dirty="0" smtClean="0"/>
-              <a:t>Crop Yields by </a:t>
-            </a:r>
-            <a:r>
-              <a:rPr lang="en-US" dirty="0" err="1" smtClean="0"/>
-              <a:t>Musym</a:t>
+              <a:t>Crop Yields by MUSYM</a:t>
             </a:r>
             <a:endParaRPr lang="en-US" dirty="0"/>
           </a:p>
@@ -11899,7 +12059,7 @@
             <a:pPr algn="ctr"/>
             <a:r>
               <a:rPr lang="en-US" sz="1600" dirty="0" smtClean="0"/>
-              <a:t>Planting and Harvesting Dates by Crop &amp; State</a:t>
+              <a:t>Planting and Harvesting Dates by Crop and State</a:t>
             </a:r>
             <a:endParaRPr lang="en-US" sz="1600" dirty="0"/>
           </a:p>
@@ -12123,6 +12283,85 @@
               <a:t>C</a:t>
             </a:r>
             <a:endParaRPr lang="en-US" sz="3600" b="1" dirty="0"/>
+          </a:p>
+        </p:txBody>
+      </p:sp>
+      <p:sp>
+        <p:nvSpPr>
+          <p:cNvPr id="24" name="Up Arrow 23"/>
+          <p:cNvSpPr/>
+          <p:nvPr/>
+        </p:nvSpPr>
+        <p:spPr>
+          <a:xfrm>
+            <a:off x="3798261" y="1143000"/>
+            <a:ext cx="1459539" cy="228600"/>
+          </a:xfrm>
+          <a:prstGeom prst="upArrow">
+            <a:avLst/>
+          </a:prstGeom>
+          <a:solidFill>
+            <a:schemeClr val="accent6">
+              <a:lumMod val="60000"/>
+              <a:lumOff val="40000"/>
+            </a:schemeClr>
+          </a:solidFill>
+          <a:ln>
+            <a:noFill/>
+          </a:ln>
+        </p:spPr>
+        <p:style>
+          <a:lnRef idx="2">
+            <a:schemeClr val="accent1">
+              <a:shade val="50000"/>
+            </a:schemeClr>
+          </a:lnRef>
+          <a:fillRef idx="1">
+            <a:schemeClr val="accent1"/>
+          </a:fillRef>
+          <a:effectRef idx="0">
+            <a:schemeClr val="accent1"/>
+          </a:effectRef>
+          <a:fontRef idx="minor">
+            <a:schemeClr val="lt1"/>
+          </a:fontRef>
+        </p:style>
+        <p:txBody>
+          <a:bodyPr rtlCol="0" anchor="ctr"/>
+          <a:lstStyle/>
+          <a:p>
+            <a:pPr algn="ctr"/>
+            <a:endParaRPr lang="en-US"/>
+          </a:p>
+        </p:txBody>
+      </p:sp>
+      <p:sp>
+        <p:nvSpPr>
+          <p:cNvPr id="8" name="TextBox 7"/>
+          <p:cNvSpPr txBox="1"/>
+          <p:nvPr/>
+        </p:nvSpPr>
+        <p:spPr>
+          <a:xfrm>
+            <a:off x="2895600" y="685800"/>
+            <a:ext cx="3439390" cy="461665"/>
+          </a:xfrm>
+          <a:prstGeom prst="rect">
+            <a:avLst/>
+          </a:prstGeom>
+          <a:noFill/>
+        </p:spPr>
+        <p:txBody>
+          <a:bodyPr wrap="square" rtlCol="0">
+            <a:spAutoFit/>
+          </a:bodyPr>
+          <a:lstStyle/>
+          <a:p>
+            <a:pPr algn="ctr"/>
+            <a:r>
+              <a:rPr lang="en-US" sz="2400" b="1" dirty="0" smtClean="0"/>
+              <a:t>Exogenous Inputs</a:t>
+            </a:r>
           </a:p>
         </p:txBody>
       </p:sp>

</xml_diff>

<commit_message>
Revert "Final Paper Submission"
This reverts commit a696e15a13d4bb2097ccbcf314737497dc47c565.
</commit_message>
<xml_diff>
--- a/Journal Paper/revision/Figures_Draft_dana.pptx
+++ b/Journal Paper/revision/Figures_Draft_dana.pptx
@@ -294,7 +294,7 @@
             <a:fld id="{3BDC0BB4-687B-47EC-9825-390C08A53E98}" type="datetimeFigureOut">
               <a:rPr lang="en-US" smtClean="0"/>
               <a:pPr/>
-              <a:t>6/24/2015</a:t>
+              <a:t>4/10/2015</a:t>
             </a:fld>
             <a:endParaRPr lang="en-US"/>
           </a:p>
@@ -466,7 +466,7 @@
             <a:fld id="{3BDC0BB4-687B-47EC-9825-390C08A53E98}" type="datetimeFigureOut">
               <a:rPr lang="en-US" smtClean="0"/>
               <a:pPr/>
-              <a:t>6/24/2015</a:t>
+              <a:t>4/10/2015</a:t>
             </a:fld>
             <a:endParaRPr lang="en-US"/>
           </a:p>
@@ -648,7 +648,7 @@
             <a:fld id="{3BDC0BB4-687B-47EC-9825-390C08A53E98}" type="datetimeFigureOut">
               <a:rPr lang="en-US" smtClean="0"/>
               <a:pPr/>
-              <a:t>6/24/2015</a:t>
+              <a:t>4/10/2015</a:t>
             </a:fld>
             <a:endParaRPr lang="en-US"/>
           </a:p>
@@ -820,7 +820,7 @@
             <a:fld id="{3BDC0BB4-687B-47EC-9825-390C08A53E98}" type="datetimeFigureOut">
               <a:rPr lang="en-US" smtClean="0"/>
               <a:pPr/>
-              <a:t>6/24/2015</a:t>
+              <a:t>4/10/2015</a:t>
             </a:fld>
             <a:endParaRPr lang="en-US"/>
           </a:p>
@@ -1068,7 +1068,7 @@
             <a:fld id="{3BDC0BB4-687B-47EC-9825-390C08A53E98}" type="datetimeFigureOut">
               <a:rPr lang="en-US" smtClean="0"/>
               <a:pPr/>
-              <a:t>6/24/2015</a:t>
+              <a:t>4/10/2015</a:t>
             </a:fld>
             <a:endParaRPr lang="en-US"/>
           </a:p>
@@ -1358,7 +1358,7 @@
             <a:fld id="{3BDC0BB4-687B-47EC-9825-390C08A53E98}" type="datetimeFigureOut">
               <a:rPr lang="en-US" smtClean="0"/>
               <a:pPr/>
-              <a:t>6/24/2015</a:t>
+              <a:t>4/10/2015</a:t>
             </a:fld>
             <a:endParaRPr lang="en-US"/>
           </a:p>
@@ -1782,7 +1782,7 @@
             <a:fld id="{3BDC0BB4-687B-47EC-9825-390C08A53E98}" type="datetimeFigureOut">
               <a:rPr lang="en-US" smtClean="0"/>
               <a:pPr/>
-              <a:t>6/24/2015</a:t>
+              <a:t>4/10/2015</a:t>
             </a:fld>
             <a:endParaRPr lang="en-US"/>
           </a:p>
@@ -1902,7 +1902,7 @@
             <a:fld id="{3BDC0BB4-687B-47EC-9825-390C08A53E98}" type="datetimeFigureOut">
               <a:rPr lang="en-US" smtClean="0"/>
               <a:pPr/>
-              <a:t>6/24/2015</a:t>
+              <a:t>4/10/2015</a:t>
             </a:fld>
             <a:endParaRPr lang="en-US"/>
           </a:p>
@@ -1999,7 +1999,7 @@
             <a:fld id="{3BDC0BB4-687B-47EC-9825-390C08A53E98}" type="datetimeFigureOut">
               <a:rPr lang="en-US" smtClean="0"/>
               <a:pPr/>
-              <a:t>6/24/2015</a:t>
+              <a:t>4/10/2015</a:t>
             </a:fld>
             <a:endParaRPr lang="en-US"/>
           </a:p>
@@ -2278,7 +2278,7 @@
             <a:fld id="{3BDC0BB4-687B-47EC-9825-390C08A53E98}" type="datetimeFigureOut">
               <a:rPr lang="en-US" smtClean="0"/>
               <a:pPr/>
-              <a:t>6/24/2015</a:t>
+              <a:t>4/10/2015</a:t>
             </a:fld>
             <a:endParaRPr lang="en-US"/>
           </a:p>
@@ -2533,7 +2533,7 @@
             <a:fld id="{3BDC0BB4-687B-47EC-9825-390C08A53E98}" type="datetimeFigureOut">
               <a:rPr lang="en-US" smtClean="0"/>
               <a:pPr/>
-              <a:t>6/24/2015</a:t>
+              <a:t>4/10/2015</a:t>
             </a:fld>
             <a:endParaRPr lang="en-US"/>
           </a:p>
@@ -2748,7 +2748,7 @@
             <a:fld id="{3BDC0BB4-687B-47EC-9825-390C08A53E98}" type="datetimeFigureOut">
               <a:rPr lang="en-US" smtClean="0"/>
               <a:pPr/>
-              <a:t>6/24/2015</a:t>
+              <a:t>4/10/2015</a:t>
             </a:fld>
             <a:endParaRPr lang="en-US"/>
           </a:p>
@@ -10953,6 +10953,7 @@
                 <a:rPr lang="en-US" sz="1250" dirty="0" smtClean="0"/>
                 <a:t>Stock</a:t>
               </a:r>
+              <a:endParaRPr lang="en-US" sz="1250" dirty="0" smtClean="0"/>
             </a:p>
           </p:txBody>
         </p:sp>
@@ -10982,6 +10983,7 @@
                 <a:rPr lang="en-US" sz="1250" dirty="0" smtClean="0"/>
                 <a:t>Flow</a:t>
               </a:r>
+              <a:endParaRPr lang="en-US" sz="1250" dirty="0" smtClean="0"/>
             </a:p>
           </p:txBody>
         </p:sp>
@@ -11715,36 +11717,12 @@
           <a:p>
             <a:pPr algn="ctr"/>
             <a:r>
-              <a:rPr lang="en-US" dirty="0">
-                <a:solidFill>
-                  <a:schemeClr val="bg1"/>
-                </a:solidFill>
-              </a:rPr>
-              <a:t>M</a:t>
-            </a:r>
-            <a:r>
               <a:rPr lang="en-US" dirty="0" smtClean="0">
                 <a:solidFill>
                   <a:schemeClr val="bg1"/>
                 </a:solidFill>
               </a:rPr>
-              <a:t>ap </a:t>
-            </a:r>
-            <a:r>
-              <a:rPr lang="en-US" dirty="0">
-                <a:solidFill>
-                  <a:schemeClr val="bg1"/>
-                </a:solidFill>
-              </a:rPr>
-              <a:t>U</a:t>
-            </a:r>
-            <a:r>
-              <a:rPr lang="en-US" dirty="0" smtClean="0">
-                <a:solidFill>
-                  <a:schemeClr val="bg1"/>
-                </a:solidFill>
-              </a:rPr>
-              <a:t>nits</a:t>
+              <a:t>map units</a:t>
             </a:r>
             <a:endParaRPr lang="en-US" dirty="0">
               <a:solidFill>

</xml_diff>